<commit_message>
seminar II revisi paper, laporan lengkap
</commit_message>
<xml_diff>
--- a/1. presentasi/Seminar Kemajuan Tesis.pptx
+++ b/1. presentasi/Seminar Kemajuan Tesis.pptx
@@ -352,7 +352,7 @@
           <a:p>
             <a:fld id="{8476A333-483B-443C-9BB4-F5BC7F6CB232}" type="datetimeFigureOut">
               <a:rPr lang="en-US" smtClean="0"/>
-              <a:t>11/6/2017</a:t>
+              <a:t>11/24/2017</a:t>
             </a:fld>
             <a:endParaRPr lang="en-US"/>
           </a:p>
@@ -542,7 +542,7 @@
           <a:p>
             <a:fld id="{8476A333-483B-443C-9BB4-F5BC7F6CB232}" type="datetimeFigureOut">
               <a:rPr lang="en-US" smtClean="0"/>
-              <a:t>11/6/2017</a:t>
+              <a:t>11/24/2017</a:t>
             </a:fld>
             <a:endParaRPr lang="en-US"/>
           </a:p>
@@ -722,7 +722,7 @@
           <a:p>
             <a:fld id="{8476A333-483B-443C-9BB4-F5BC7F6CB232}" type="datetimeFigureOut">
               <a:rPr lang="en-US" smtClean="0"/>
-              <a:t>11/6/2017</a:t>
+              <a:t>11/24/2017</a:t>
             </a:fld>
             <a:endParaRPr lang="en-US"/>
           </a:p>
@@ -892,7 +892,7 @@
           <a:p>
             <a:fld id="{8476A333-483B-443C-9BB4-F5BC7F6CB232}" type="datetimeFigureOut">
               <a:rPr lang="en-US" smtClean="0"/>
-              <a:t>11/6/2017</a:t>
+              <a:t>11/24/2017</a:t>
             </a:fld>
             <a:endParaRPr lang="en-US"/>
           </a:p>
@@ -1148,7 +1148,7 @@
           <a:p>
             <a:fld id="{8476A333-483B-443C-9BB4-F5BC7F6CB232}" type="datetimeFigureOut">
               <a:rPr lang="en-US" smtClean="0"/>
-              <a:t>11/6/2017</a:t>
+              <a:t>11/24/2017</a:t>
             </a:fld>
             <a:endParaRPr lang="en-US"/>
           </a:p>
@@ -1436,7 +1436,7 @@
           <a:p>
             <a:fld id="{8476A333-483B-443C-9BB4-F5BC7F6CB232}" type="datetimeFigureOut">
               <a:rPr lang="en-US" smtClean="0"/>
-              <a:t>11/6/2017</a:t>
+              <a:t>11/24/2017</a:t>
             </a:fld>
             <a:endParaRPr lang="en-US"/>
           </a:p>
@@ -1874,7 +1874,7 @@
           <a:p>
             <a:fld id="{8476A333-483B-443C-9BB4-F5BC7F6CB232}" type="datetimeFigureOut">
               <a:rPr lang="en-US" smtClean="0"/>
-              <a:t>11/6/2017</a:t>
+              <a:t>11/24/2017</a:t>
             </a:fld>
             <a:endParaRPr lang="en-US"/>
           </a:p>
@@ -1992,7 +1992,7 @@
           <a:p>
             <a:fld id="{8476A333-483B-443C-9BB4-F5BC7F6CB232}" type="datetimeFigureOut">
               <a:rPr lang="en-US" smtClean="0"/>
-              <a:t>11/6/2017</a:t>
+              <a:t>11/24/2017</a:t>
             </a:fld>
             <a:endParaRPr lang="en-US"/>
           </a:p>
@@ -2087,7 +2087,7 @@
           <a:p>
             <a:fld id="{8476A333-483B-443C-9BB4-F5BC7F6CB232}" type="datetimeFigureOut">
               <a:rPr lang="en-US" smtClean="0"/>
-              <a:t>11/6/2017</a:t>
+              <a:t>11/24/2017</a:t>
             </a:fld>
             <a:endParaRPr lang="en-US"/>
           </a:p>
@@ -2443,7 +2443,7 @@
           <a:p>
             <a:fld id="{8476A333-483B-443C-9BB4-F5BC7F6CB232}" type="datetimeFigureOut">
               <a:rPr lang="en-US" smtClean="0"/>
-              <a:t>11/6/2017</a:t>
+              <a:t>11/24/2017</a:t>
             </a:fld>
             <a:endParaRPr lang="en-US"/>
           </a:p>
@@ -2759,7 +2759,7 @@
           <a:p>
             <a:fld id="{8476A333-483B-443C-9BB4-F5BC7F6CB232}" type="datetimeFigureOut">
               <a:rPr lang="en-US" smtClean="0"/>
-              <a:t>11/6/2017</a:t>
+              <a:t>11/24/2017</a:t>
             </a:fld>
             <a:endParaRPr lang="en-US"/>
           </a:p>
@@ -2992,7 +2992,7 @@
           <a:p>
             <a:fld id="{8476A333-483B-443C-9BB4-F5BC7F6CB232}" type="datetimeFigureOut">
               <a:rPr lang="en-US" smtClean="0"/>
-              <a:t>11/6/2017</a:t>
+              <a:t>11/24/2017</a:t>
             </a:fld>
             <a:endParaRPr lang="en-US"/>
           </a:p>
@@ -19579,19 +19579,7 @@
                           <a:rPr lang="en-US" sz="2400" i="1">
                             <a:latin typeface="Cambria Math" panose="02040503050406030204" pitchFamily="18" charset="0"/>
                           </a:rPr>
-                          <m:t>(</m:t>
-                        </m:r>
-                        <m:r>
-                          <a:rPr lang="en-US" sz="2400" i="1">
-                            <a:latin typeface="Cambria Math" panose="02040503050406030204" pitchFamily="18" charset="0"/>
-                          </a:rPr>
-                          <m:t>1</m:t>
-                        </m:r>
-                        <m:r>
-                          <a:rPr lang="en-US" sz="2400" i="1">
-                            <a:latin typeface="Cambria Math" panose="02040503050406030204" pitchFamily="18" charset="0"/>
-                          </a:rPr>
-                          <m:t>+</m:t>
+                          <m:t>(1+</m:t>
                         </m:r>
                         <m:sSup>
                           <m:sSupPr>
@@ -19680,19 +19668,7 @@
                           <a:rPr lang="en-US" sz="2400" i="1">
                             <a:latin typeface="Cambria Math" panose="02040503050406030204" pitchFamily="18" charset="0"/>
                           </a:rPr>
-                          <m:t>(</m:t>
-                        </m:r>
-                        <m:r>
-                          <a:rPr lang="en-US" sz="2400" i="1">
-                            <a:latin typeface="Cambria Math" panose="02040503050406030204" pitchFamily="18" charset="0"/>
-                          </a:rPr>
-                          <m:t>1</m:t>
-                        </m:r>
-                        <m:r>
-                          <a:rPr lang="en-US" sz="2400" i="1">
-                            <a:latin typeface="Cambria Math" panose="02040503050406030204" pitchFamily="18" charset="0"/>
-                          </a:rPr>
-                          <m:t>+</m:t>
+                          <m:t>(1+</m:t>
                         </m:r>
                         <m:sSup>
                           <m:sSupPr>
@@ -19721,19 +19697,7 @@
                               <a:rPr lang="en-US" sz="2400" b="0" i="1" smtClean="0">
                                 <a:latin typeface="Cambria Math" panose="02040503050406030204" pitchFamily="18" charset="0"/>
                               </a:rPr>
-                              <m:t>0</m:t>
-                            </m:r>
-                            <m:r>
-                              <a:rPr lang="en-US" sz="2400" b="0" i="1" smtClean="0">
-                                <a:latin typeface="Cambria Math" panose="02040503050406030204" pitchFamily="18" charset="0"/>
-                              </a:rPr>
-                              <m:t>.</m:t>
-                            </m:r>
-                            <m:r>
-                              <a:rPr lang="en-US" sz="2400" b="0" i="1" smtClean="0">
-                                <a:latin typeface="Cambria Math" panose="02040503050406030204" pitchFamily="18" charset="0"/>
-                              </a:rPr>
-                              <m:t>1</m:t>
+                              <m:t>0.1</m:t>
                             </m:r>
                           </m:sup>
                         </m:sSup>
@@ -20204,19 +20168,7 @@
                           <a:rPr lang="en-US" sz="2400" i="1">
                             <a:latin typeface="Cambria Math" panose="02040503050406030204" pitchFamily="18" charset="0"/>
                           </a:rPr>
-                          <m:t>(</m:t>
-                        </m:r>
-                        <m:r>
-                          <a:rPr lang="en-US" sz="2400" i="1">
-                            <a:latin typeface="Cambria Math" panose="02040503050406030204" pitchFamily="18" charset="0"/>
-                          </a:rPr>
-                          <m:t>1</m:t>
-                        </m:r>
-                        <m:r>
-                          <a:rPr lang="en-US" sz="2400" i="1">
-                            <a:latin typeface="Cambria Math" panose="02040503050406030204" pitchFamily="18" charset="0"/>
-                          </a:rPr>
-                          <m:t>+</m:t>
+                          <m:t>(1+</m:t>
                         </m:r>
                         <m:sSup>
                           <m:sSupPr>
@@ -20251,19 +20203,7 @@
                               <a:rPr lang="en-US" sz="2400" i="1" smtClean="0">
                                 <a:latin typeface="Cambria Math" panose="02040503050406030204" pitchFamily="18" charset="0"/>
                               </a:rPr>
-                              <m:t>0</m:t>
-                            </m:r>
-                            <m:r>
-                              <a:rPr lang="en-US" sz="2400" i="1" smtClean="0">
-                                <a:latin typeface="Cambria Math" panose="02040503050406030204" pitchFamily="18" charset="0"/>
-                              </a:rPr>
-                              <m:t>.</m:t>
-                            </m:r>
-                            <m:r>
-                              <a:rPr lang="en-US" sz="2400" i="1" smtClean="0">
-                                <a:latin typeface="Cambria Math" panose="02040503050406030204" pitchFamily="18" charset="0"/>
-                              </a:rPr>
-                              <m:t>1</m:t>
+                              <m:t>0.1</m:t>
                             </m:r>
                             <m:r>
                               <a:rPr lang="en-US" sz="2400" b="0" i="1" smtClean="0">
@@ -20477,19 +20417,7 @@
                           <a:rPr lang="en-US" sz="2400" i="1">
                             <a:latin typeface="Cambria Math" panose="02040503050406030204" pitchFamily="18" charset="0"/>
                           </a:rPr>
-                          <m:t>(</m:t>
-                        </m:r>
-                        <m:r>
-                          <a:rPr lang="en-US" sz="2400" i="1">
-                            <a:latin typeface="Cambria Math" panose="02040503050406030204" pitchFamily="18" charset="0"/>
-                          </a:rPr>
-                          <m:t>1</m:t>
-                        </m:r>
-                        <m:r>
-                          <a:rPr lang="en-US" sz="2400" i="1">
-                            <a:latin typeface="Cambria Math" panose="02040503050406030204" pitchFamily="18" charset="0"/>
-                          </a:rPr>
-                          <m:t>+</m:t>
+                          <m:t>(1+</m:t>
                         </m:r>
                         <m:sSup>
                           <m:sSupPr>
@@ -20512,25 +20440,7 @@
                               <a:rPr lang="en-US" sz="2400" i="1">
                                 <a:latin typeface="Cambria Math" panose="02040503050406030204" pitchFamily="18" charset="0"/>
                               </a:rPr>
-                              <m:t>−</m:t>
-                            </m:r>
-                            <m:r>
-                              <a:rPr lang="en-US" sz="2400" i="1">
-                                <a:latin typeface="Cambria Math" panose="02040503050406030204" pitchFamily="18" charset="0"/>
-                              </a:rPr>
-                              <m:t>0</m:t>
-                            </m:r>
-                            <m:r>
-                              <a:rPr lang="en-US" sz="2400" i="1">
-                                <a:latin typeface="Cambria Math" panose="02040503050406030204" pitchFamily="18" charset="0"/>
-                              </a:rPr>
-                              <m:t>.</m:t>
-                            </m:r>
-                            <m:r>
-                              <a:rPr lang="en-US" sz="2400" i="1">
-                                <a:latin typeface="Cambria Math" panose="02040503050406030204" pitchFamily="18" charset="0"/>
-                              </a:rPr>
-                              <m:t>158</m:t>
+                              <m:t>−0.158</m:t>
                             </m:r>
                           </m:sup>
                         </m:sSup>
@@ -26750,10 +26660,13 @@
               </a:rPr>
               <a:t>ZhangSuen</a:t>
             </a:r>
-            <a:endParaRPr lang="en-US" sz="1200" dirty="0">
-              <a:latin typeface="Times New Roman" panose="02020603050405020304" pitchFamily="18" charset="0"/>
-              <a:cs typeface="Times New Roman" panose="02020603050405020304" pitchFamily="18" charset="0"/>
-            </a:endParaRPr>
+            <a:r>
+              <a:rPr lang="en-US" sz="1200" dirty="0">
+                <a:latin typeface="Times New Roman" panose="02020603050405020304" pitchFamily="18" charset="0"/>
+                <a:cs typeface="Times New Roman" panose="02020603050405020304" pitchFamily="18" charset="0"/>
+              </a:rPr>
+              <a:t> </a:t>
+            </a:r>
           </a:p>
         </p:txBody>
       </p:sp>
@@ -26785,7 +26698,7 @@
         </p:blipFill>
         <p:spPr>
           <a:xfrm>
-            <a:off x="4367929" y="4704522"/>
+            <a:off x="4260839" y="4712825"/>
             <a:ext cx="1030266" cy="1050871"/>
           </a:xfrm>
           <a:prstGeom prst="rect">
@@ -26808,7 +26721,7 @@
         <p:spPr>
           <a:xfrm>
             <a:off x="4482150" y="5467999"/>
-            <a:ext cx="801823" cy="276999"/>
+            <a:ext cx="840295" cy="276999"/>
           </a:xfrm>
           <a:prstGeom prst="rect">
             <a:avLst/>
@@ -26828,10 +26741,13 @@
               </a:rPr>
               <a:t>Stentiford</a:t>
             </a:r>
-            <a:endParaRPr lang="en-US" sz="1200" dirty="0">
-              <a:latin typeface="Times New Roman" panose="02020603050405020304" pitchFamily="18" charset="0"/>
-              <a:cs typeface="Times New Roman" panose="02020603050405020304" pitchFamily="18" charset="0"/>
-            </a:endParaRPr>
+            <a:r>
+              <a:rPr lang="en-US" sz="1200" dirty="0">
+                <a:latin typeface="Times New Roman" panose="02020603050405020304" pitchFamily="18" charset="0"/>
+                <a:cs typeface="Times New Roman" panose="02020603050405020304" pitchFamily="18" charset="0"/>
+              </a:rPr>
+              <a:t> </a:t>
+            </a:r>
           </a:p>
         </p:txBody>
       </p:sp>
@@ -26886,7 +26802,7 @@
         <p:spPr>
           <a:xfrm>
             <a:off x="5665930" y="5467999"/>
-            <a:ext cx="691215" cy="276999"/>
+            <a:ext cx="729687" cy="276999"/>
           </a:xfrm>
           <a:prstGeom prst="rect">
             <a:avLst/>
@@ -26906,10 +26822,13 @@
               </a:rPr>
               <a:t>Hilditch</a:t>
             </a:r>
-            <a:endParaRPr lang="en-US" sz="1200" dirty="0">
-              <a:latin typeface="Times New Roman" panose="02020603050405020304" pitchFamily="18" charset="0"/>
-              <a:cs typeface="Times New Roman" panose="02020603050405020304" pitchFamily="18" charset="0"/>
-            </a:endParaRPr>
+            <a:r>
+              <a:rPr lang="en-US" sz="1200" dirty="0">
+                <a:latin typeface="Times New Roman" panose="02020603050405020304" pitchFamily="18" charset="0"/>
+                <a:cs typeface="Times New Roman" panose="02020603050405020304" pitchFamily="18" charset="0"/>
+              </a:rPr>
+              <a:t> </a:t>
+            </a:r>
           </a:p>
         </p:txBody>
       </p:sp>

</xml_diff>